<commit_message>
Informatik, Spanisch, Mathe, Betriebwirtschaftslehre
</commit_message>
<xml_diff>
--- a/Informatik/Dynamische Datenstrukturen.pptx
+++ b/Informatik/Dynamische Datenstrukturen.pptx
@@ -5,7 +5,7 @@
     <p:sldMasterId id="2147483648" r:id="rId1"/>
   </p:sldMasterIdLst>
   <p:notesMasterIdLst>
-    <p:notesMasterId r:id="rId27"/>
+    <p:notesMasterId r:id="rId29"/>
   </p:notesMasterIdLst>
   <p:sldIdLst>
     <p:sldId id="256" r:id="rId2"/>
@@ -32,7 +32,9 @@
     <p:sldId id="277" r:id="rId23"/>
     <p:sldId id="279" r:id="rId24"/>
     <p:sldId id="280" r:id="rId25"/>
-    <p:sldId id="281" r:id="rId26"/>
+    <p:sldId id="283" r:id="rId26"/>
+    <p:sldId id="282" r:id="rId27"/>
+    <p:sldId id="281" r:id="rId28"/>
   </p:sldIdLst>
   <p:sldSz cx="12192000" cy="6858000"/>
   <p:notesSz cx="6858000" cy="9144000"/>
@@ -221,7 +223,7 @@
           <a:p>
             <a:fld id="{956BC06E-4695-4D92-BAA8-C1984B21E568}" type="datetimeFigureOut">
               <a:rPr lang="de-DE" smtClean="0"/>
-              <a:t>30.01.2024</a:t>
+              <a:t>31.01.2024</a:t>
             </a:fld>
             <a:endParaRPr lang="de-DE"/>
           </a:p>
@@ -635,7 +637,7 @@
           <a:p>
             <a:fld id="{1C0C3597-A09E-44A0-A4B9-9253CC0B43A8}" type="datetimeFigureOut">
               <a:rPr lang="de-DE" smtClean="0"/>
-              <a:t>30.01.2024</a:t>
+              <a:t>31.01.2024</a:t>
             </a:fld>
             <a:endParaRPr lang="de-DE"/>
           </a:p>
@@ -833,7 +835,7 @@
           <a:p>
             <a:fld id="{1C0C3597-A09E-44A0-A4B9-9253CC0B43A8}" type="datetimeFigureOut">
               <a:rPr lang="de-DE" smtClean="0"/>
-              <a:t>30.01.2024</a:t>
+              <a:t>31.01.2024</a:t>
             </a:fld>
             <a:endParaRPr lang="de-DE"/>
           </a:p>
@@ -1041,7 +1043,7 @@
           <a:p>
             <a:fld id="{1C0C3597-A09E-44A0-A4B9-9253CC0B43A8}" type="datetimeFigureOut">
               <a:rPr lang="de-DE" smtClean="0"/>
-              <a:t>30.01.2024</a:t>
+              <a:t>31.01.2024</a:t>
             </a:fld>
             <a:endParaRPr lang="de-DE"/>
           </a:p>
@@ -1239,7 +1241,7 @@
           <a:p>
             <a:fld id="{1C0C3597-A09E-44A0-A4B9-9253CC0B43A8}" type="datetimeFigureOut">
               <a:rPr lang="de-DE" smtClean="0"/>
-              <a:t>30.01.2024</a:t>
+              <a:t>31.01.2024</a:t>
             </a:fld>
             <a:endParaRPr lang="de-DE"/>
           </a:p>
@@ -1514,7 +1516,7 @@
           <a:p>
             <a:fld id="{1C0C3597-A09E-44A0-A4B9-9253CC0B43A8}" type="datetimeFigureOut">
               <a:rPr lang="de-DE" smtClean="0"/>
-              <a:t>30.01.2024</a:t>
+              <a:t>31.01.2024</a:t>
             </a:fld>
             <a:endParaRPr lang="de-DE"/>
           </a:p>
@@ -1779,7 +1781,7 @@
           <a:p>
             <a:fld id="{1C0C3597-A09E-44A0-A4B9-9253CC0B43A8}" type="datetimeFigureOut">
               <a:rPr lang="de-DE" smtClean="0"/>
-              <a:t>30.01.2024</a:t>
+              <a:t>31.01.2024</a:t>
             </a:fld>
             <a:endParaRPr lang="de-DE"/>
           </a:p>
@@ -2191,7 +2193,7 @@
           <a:p>
             <a:fld id="{1C0C3597-A09E-44A0-A4B9-9253CC0B43A8}" type="datetimeFigureOut">
               <a:rPr lang="de-DE" smtClean="0"/>
-              <a:t>30.01.2024</a:t>
+              <a:t>31.01.2024</a:t>
             </a:fld>
             <a:endParaRPr lang="de-DE"/>
           </a:p>
@@ -2332,7 +2334,7 @@
           <a:p>
             <a:fld id="{1C0C3597-A09E-44A0-A4B9-9253CC0B43A8}" type="datetimeFigureOut">
               <a:rPr lang="de-DE" smtClean="0"/>
-              <a:t>30.01.2024</a:t>
+              <a:t>31.01.2024</a:t>
             </a:fld>
             <a:endParaRPr lang="de-DE"/>
           </a:p>
@@ -2445,7 +2447,7 @@
           <a:p>
             <a:fld id="{1C0C3597-A09E-44A0-A4B9-9253CC0B43A8}" type="datetimeFigureOut">
               <a:rPr lang="de-DE" smtClean="0"/>
-              <a:t>30.01.2024</a:t>
+              <a:t>31.01.2024</a:t>
             </a:fld>
             <a:endParaRPr lang="de-DE"/>
           </a:p>
@@ -2756,7 +2758,7 @@
           <a:p>
             <a:fld id="{1C0C3597-A09E-44A0-A4B9-9253CC0B43A8}" type="datetimeFigureOut">
               <a:rPr lang="de-DE" smtClean="0"/>
-              <a:t>30.01.2024</a:t>
+              <a:t>31.01.2024</a:t>
             </a:fld>
             <a:endParaRPr lang="de-DE"/>
           </a:p>
@@ -3044,7 +3046,7 @@
           <a:p>
             <a:fld id="{1C0C3597-A09E-44A0-A4B9-9253CC0B43A8}" type="datetimeFigureOut">
               <a:rPr lang="de-DE" smtClean="0"/>
-              <a:t>30.01.2024</a:t>
+              <a:t>31.01.2024</a:t>
             </a:fld>
             <a:endParaRPr lang="de-DE"/>
           </a:p>
@@ -3285,7 +3287,7 @@
           <a:p>
             <a:fld id="{1C0C3597-A09E-44A0-A4B9-9253CC0B43A8}" type="datetimeFigureOut">
               <a:rPr lang="de-DE" smtClean="0"/>
-              <a:t>30.01.2024</a:t>
+              <a:t>31.01.2024</a:t>
             </a:fld>
             <a:endParaRPr lang="de-DE"/>
           </a:p>
@@ -21996,6 +21998,351 @@
 </file>
 
 <file path=ppt/slides/slide25.xml><?xml version="1.0" encoding="utf-8"?>
+<p:sld xmlns:a="http://schemas.openxmlformats.org/drawingml/2006/main" xmlns:r="http://schemas.openxmlformats.org/officeDocument/2006/relationships" xmlns:p="http://schemas.openxmlformats.org/presentationml/2006/main">
+  <p:cSld>
+    <p:bg>
+      <p:bgPr>
+        <a:solidFill>
+          <a:schemeClr val="tx1">
+            <a:lumMod val="75000"/>
+            <a:lumOff val="25000"/>
+          </a:schemeClr>
+        </a:solidFill>
+        <a:effectLst/>
+      </p:bgPr>
+    </p:bg>
+    <p:spTree>
+      <p:nvGrpSpPr>
+        <p:cNvPr id="1" name=""/>
+        <p:cNvGrpSpPr/>
+        <p:nvPr/>
+      </p:nvGrpSpPr>
+      <p:grpSpPr>
+        <a:xfrm>
+          <a:off x="0" y="0"/>
+          <a:ext cx="0" cy="0"/>
+          <a:chOff x="0" y="0"/>
+          <a:chExt cx="0" cy="0"/>
+        </a:xfrm>
+      </p:grpSpPr>
+      <p:sp>
+        <p:nvSpPr>
+          <p:cNvPr id="7" name="Textfeld 6">
+            <a:extLst>
+              <a:ext uri="{FF2B5EF4-FFF2-40B4-BE49-F238E27FC236}">
+                <a16:creationId xmlns:a16="http://schemas.microsoft.com/office/drawing/2014/main" id="{8D2926ED-FD6E-798E-9F84-C53D65F1A2E9}"/>
+              </a:ext>
+            </a:extLst>
+          </p:cNvPr>
+          <p:cNvSpPr txBox="1"/>
+          <p:nvPr/>
+        </p:nvSpPr>
+        <p:spPr>
+          <a:xfrm>
+            <a:off x="1652587" y="797510"/>
+            <a:ext cx="8886825" cy="5262979"/>
+          </a:xfrm>
+          <a:prstGeom prst="rect">
+            <a:avLst/>
+          </a:prstGeom>
+          <a:noFill/>
+        </p:spPr>
+        <p:txBody>
+          <a:bodyPr wrap="square">
+            <a:spAutoFit/>
+          </a:bodyPr>
+          <a:lstStyle/>
+          <a:p>
+            <a:pPr algn="ctr"/>
+            <a:r>
+              <a:rPr lang="de-DE" sz="2800" b="1" dirty="0">
+                <a:solidFill>
+                  <a:schemeClr val="bg1"/>
+                </a:solidFill>
+                <a:latin typeface="+mj-lt"/>
+              </a:rPr>
+              <a:t>3.8 Implementieren Sie die Methode </a:t>
+            </a:r>
+            <a:r>
+              <a:rPr lang="de-DE" sz="2800" b="1" dirty="0" err="1">
+                <a:solidFill>
+                  <a:schemeClr val="bg1"/>
+                </a:solidFill>
+                <a:latin typeface="+mj-lt"/>
+              </a:rPr>
+              <a:t>ballOut</a:t>
+            </a:r>
+            <a:r>
+              <a:rPr lang="de-DE" sz="2800" b="1" dirty="0">
+                <a:solidFill>
+                  <a:schemeClr val="bg1"/>
+                </a:solidFill>
+                <a:latin typeface="+mj-lt"/>
+              </a:rPr>
+              <a:t>, die das Einfügen aller Ereignisse der Queue </a:t>
+            </a:r>
+            <a:r>
+              <a:rPr lang="de-DE" sz="2800" b="1" dirty="0" err="1">
+                <a:solidFill>
+                  <a:schemeClr val="bg1"/>
+                </a:solidFill>
+                <a:latin typeface="+mj-lt"/>
+              </a:rPr>
+              <a:t>eventQueue</a:t>
+            </a:r>
+            <a:r>
+              <a:rPr lang="de-DE" sz="2800" b="1" dirty="0">
+                <a:solidFill>
+                  <a:schemeClr val="bg1"/>
+                </a:solidFill>
+                <a:latin typeface="+mj-lt"/>
+              </a:rPr>
+              <a:t> in die Liste </a:t>
+            </a:r>
+            <a:r>
+              <a:rPr lang="de-DE" sz="2800" b="1" dirty="0" err="1">
+                <a:solidFill>
+                  <a:schemeClr val="bg1"/>
+                </a:solidFill>
+                <a:latin typeface="+mj-lt"/>
+              </a:rPr>
+              <a:t>eventList</a:t>
+            </a:r>
+            <a:r>
+              <a:rPr lang="de-DE" sz="2800" b="1" dirty="0">
+                <a:solidFill>
+                  <a:schemeClr val="bg1"/>
+                </a:solidFill>
+                <a:latin typeface="+mj-lt"/>
+              </a:rPr>
+              <a:t> sortiert nach der </a:t>
+            </a:r>
+            <a:r>
+              <a:rPr lang="de-DE" sz="2800" b="1" dirty="0" err="1">
+                <a:solidFill>
+                  <a:schemeClr val="bg1"/>
+                </a:solidFill>
+                <a:latin typeface="+mj-lt"/>
+              </a:rPr>
+              <a:t>SensorGroupNumber</a:t>
+            </a:r>
+            <a:r>
+              <a:rPr lang="de-DE" sz="2800" b="1" dirty="0">
+                <a:solidFill>
+                  <a:schemeClr val="bg1"/>
+                </a:solidFill>
+                <a:latin typeface="+mj-lt"/>
+              </a:rPr>
+              <a:t> realisiert. Das Element mit der kleinsten </a:t>
+            </a:r>
+            <a:r>
+              <a:rPr lang="de-DE" sz="2800" b="1" dirty="0" err="1">
+                <a:solidFill>
+                  <a:schemeClr val="bg1"/>
+                </a:solidFill>
+                <a:latin typeface="+mj-lt"/>
+              </a:rPr>
+              <a:t>SensorGroupNumber</a:t>
+            </a:r>
+            <a:r>
+              <a:rPr lang="de-DE" sz="2800" b="1" dirty="0">
+                <a:solidFill>
+                  <a:schemeClr val="bg1"/>
+                </a:solidFill>
+                <a:latin typeface="+mj-lt"/>
+              </a:rPr>
+              <a:t> soll dabei am Anfang der Liste stehen. Sie können alle Methoden der Klassen Queue und List (vgl. Anlagen 3 und 4) als gegeben voraussetzen und nutzen. Sie können davon ausgehen, dass die Liste bei Aufruf von </a:t>
+            </a:r>
+            <a:r>
+              <a:rPr lang="de-DE" sz="2800" b="1" dirty="0" err="1">
+                <a:solidFill>
+                  <a:schemeClr val="bg1"/>
+                </a:solidFill>
+                <a:latin typeface="+mj-lt"/>
+              </a:rPr>
+              <a:t>ballOut</a:t>
+            </a:r>
+            <a:r>
+              <a:rPr lang="de-DE" sz="2800" b="1" dirty="0">
+                <a:solidFill>
+                  <a:schemeClr val="bg1"/>
+                </a:solidFill>
+                <a:latin typeface="+mj-lt"/>
+              </a:rPr>
+              <a:t> leer ist. </a:t>
+            </a:r>
+          </a:p>
+          <a:p>
+            <a:pPr algn="ctr"/>
+            <a:r>
+              <a:rPr lang="de-DE" sz="2800" b="1" i="0" dirty="0">
+                <a:solidFill>
+                  <a:schemeClr val="bg1"/>
+                </a:solidFill>
+                <a:effectLst/>
+                <a:latin typeface="+mj-lt"/>
+              </a:rPr>
+              <a:t>(12 Punkte) – siehe </a:t>
+            </a:r>
+            <a:r>
+              <a:rPr lang="de-DE" sz="2800" b="1" i="0" dirty="0" err="1">
+                <a:solidFill>
+                  <a:schemeClr val="bg1"/>
+                </a:solidFill>
+                <a:effectLst/>
+                <a:latin typeface="+mj-lt"/>
+              </a:rPr>
+              <a:t>Abiturpruefung</a:t>
+            </a:r>
+            <a:r>
+              <a:rPr lang="de-DE" sz="2800" b="1" i="0" dirty="0">
+                <a:solidFill>
+                  <a:schemeClr val="bg1"/>
+                </a:solidFill>
+                <a:effectLst/>
+                <a:latin typeface="+mj-lt"/>
+              </a:rPr>
+              <a:t> </a:t>
+            </a:r>
+            <a:r>
+              <a:rPr lang="de-DE" sz="2800" b="1" i="0" dirty="0" err="1">
+                <a:solidFill>
+                  <a:schemeClr val="bg1"/>
+                </a:solidFill>
+                <a:effectLst/>
+                <a:latin typeface="+mj-lt"/>
+              </a:rPr>
+              <a:t>fuer</a:t>
+            </a:r>
+            <a:r>
+              <a:rPr lang="de-DE" sz="2800" b="1" i="0" dirty="0">
+                <a:solidFill>
+                  <a:schemeClr val="bg1"/>
+                </a:solidFill>
+                <a:effectLst/>
+                <a:latin typeface="+mj-lt"/>
+              </a:rPr>
+              <a:t> Kontext</a:t>
+            </a:r>
+          </a:p>
+          <a:p>
+            <a:pPr algn="ctr"/>
+            <a:endParaRPr lang="de-DE" sz="2800" b="1" i="0" dirty="0">
+              <a:solidFill>
+                <a:srgbClr val="DADADA"/>
+              </a:solidFill>
+              <a:effectLst/>
+              <a:latin typeface="+mj-lt"/>
+            </a:endParaRPr>
+          </a:p>
+          <a:p>
+            <a:pPr algn="ctr"/>
+            <a:endParaRPr lang="de-DE" sz="2800" b="1" i="0" dirty="0">
+              <a:solidFill>
+                <a:srgbClr val="DADADA"/>
+              </a:solidFill>
+              <a:effectLst/>
+              <a:latin typeface="+mj-lt"/>
+            </a:endParaRPr>
+          </a:p>
+        </p:txBody>
+      </p:sp>
+    </p:spTree>
+    <p:extLst>
+      <p:ext uri="{BB962C8B-B14F-4D97-AF65-F5344CB8AC3E}">
+        <p14:creationId xmlns:p14="http://schemas.microsoft.com/office/powerpoint/2010/main" val="2074446863"/>
+      </p:ext>
+    </p:extLst>
+  </p:cSld>
+  <p:clrMapOvr>
+    <a:masterClrMapping/>
+  </p:clrMapOvr>
+  <p:transition spd="slow">
+    <p:cover/>
+  </p:transition>
+</p:sld>
+</file>
+
+<file path=ppt/slides/slide26.xml><?xml version="1.0" encoding="utf-8"?>
+<p:sld xmlns:a="http://schemas.openxmlformats.org/drawingml/2006/main" xmlns:r="http://schemas.openxmlformats.org/officeDocument/2006/relationships" xmlns:p="http://schemas.openxmlformats.org/presentationml/2006/main">
+  <p:cSld>
+    <p:bg>
+      <p:bgPr>
+        <a:solidFill>
+          <a:schemeClr val="tx1">
+            <a:lumMod val="75000"/>
+            <a:lumOff val="25000"/>
+          </a:schemeClr>
+        </a:solidFill>
+        <a:effectLst/>
+      </p:bgPr>
+    </p:bg>
+    <p:spTree>
+      <p:nvGrpSpPr>
+        <p:cNvPr id="1" name=""/>
+        <p:cNvGrpSpPr/>
+        <p:nvPr/>
+      </p:nvGrpSpPr>
+      <p:grpSpPr>
+        <a:xfrm>
+          <a:off x="0" y="0"/>
+          <a:ext cx="0" cy="0"/>
+          <a:chOff x="0" y="0"/>
+          <a:chExt cx="0" cy="0"/>
+        </a:xfrm>
+      </p:grpSpPr>
+      <p:pic>
+        <p:nvPicPr>
+          <p:cNvPr id="3" name="Grafik 2">
+            <a:extLst>
+              <a:ext uri="{FF2B5EF4-FFF2-40B4-BE49-F238E27FC236}">
+                <a16:creationId xmlns:a16="http://schemas.microsoft.com/office/drawing/2014/main" id="{FDD0BBA9-4BF7-4B7E-9D58-0A5A85701808}"/>
+              </a:ext>
+            </a:extLst>
+          </p:cNvPr>
+          <p:cNvPicPr>
+            <a:picLocks noChangeAspect="1"/>
+          </p:cNvPicPr>
+          <p:nvPr/>
+        </p:nvPicPr>
+        <p:blipFill>
+          <a:blip r:embed="rId2"/>
+          <a:stretch>
+            <a:fillRect/>
+          </a:stretch>
+        </p:blipFill>
+        <p:spPr>
+          <a:xfrm>
+            <a:off x="99774" y="80738"/>
+            <a:ext cx="7517099" cy="6695200"/>
+          </a:xfrm>
+          <a:prstGeom prst="rect">
+            <a:avLst/>
+          </a:prstGeom>
+          <a:ln w="25400">
+            <a:solidFill>
+              <a:schemeClr val="bg1"/>
+            </a:solidFill>
+          </a:ln>
+        </p:spPr>
+      </p:pic>
+    </p:spTree>
+    <p:extLst>
+      <p:ext uri="{BB962C8B-B14F-4D97-AF65-F5344CB8AC3E}">
+        <p14:creationId xmlns:p14="http://schemas.microsoft.com/office/powerpoint/2010/main" val="1453039155"/>
+      </p:ext>
+    </p:extLst>
+  </p:cSld>
+  <p:clrMapOvr>
+    <a:masterClrMapping/>
+  </p:clrMapOvr>
+  <p:transition spd="slow">
+    <p:cover/>
+  </p:transition>
+</p:sld>
+</file>
+
+<file path=ppt/slides/slide27.xml><?xml version="1.0" encoding="utf-8"?>
 <p:sld xmlns:a="http://schemas.openxmlformats.org/drawingml/2006/main" xmlns:r="http://schemas.openxmlformats.org/officeDocument/2006/relationships" xmlns:p="http://schemas.openxmlformats.org/presentationml/2006/main">
   <p:cSld>
     <p:bg>

</xml_diff>